<commit_message>
Uploading changes to Capstone 2 slide-deck and Cowboys Cigrettes Case Study
</commit_message>
<xml_diff>
--- a/18.6.1 Capstone Two/Human Speech Emotion Recognition Slidedeck.pptx
+++ b/18.6.1 Capstone Two/Human Speech Emotion Recognition Slidedeck.pptx
@@ -7,18 +7,19 @@
   <p:sldIdLst>
     <p:sldId id="256" r:id="rId2"/>
     <p:sldId id="257" r:id="rId3"/>
-    <p:sldId id="258" r:id="rId4"/>
-    <p:sldId id="259" r:id="rId5"/>
-    <p:sldId id="260" r:id="rId6"/>
-    <p:sldId id="261" r:id="rId7"/>
-    <p:sldId id="262" r:id="rId8"/>
-    <p:sldId id="267" r:id="rId9"/>
-    <p:sldId id="263" r:id="rId10"/>
-    <p:sldId id="264" r:id="rId11"/>
-    <p:sldId id="265" r:id="rId12"/>
-    <p:sldId id="266" r:id="rId13"/>
-    <p:sldId id="268" r:id="rId14"/>
-    <p:sldId id="269" r:id="rId15"/>
+    <p:sldId id="270" r:id="rId4"/>
+    <p:sldId id="258" r:id="rId5"/>
+    <p:sldId id="259" r:id="rId6"/>
+    <p:sldId id="260" r:id="rId7"/>
+    <p:sldId id="261" r:id="rId8"/>
+    <p:sldId id="262" r:id="rId9"/>
+    <p:sldId id="267" r:id="rId10"/>
+    <p:sldId id="263" r:id="rId11"/>
+    <p:sldId id="264" r:id="rId12"/>
+    <p:sldId id="265" r:id="rId13"/>
+    <p:sldId id="266" r:id="rId14"/>
+    <p:sldId id="268" r:id="rId15"/>
+    <p:sldId id="269" r:id="rId16"/>
   </p:sldIdLst>
   <p:sldSz cx="9144000" cy="6858000" type="screen4x3"/>
   <p:notesSz cx="6858000" cy="9144000"/>
@@ -301,7 +302,7 @@
           <a:p>
             <a:fld id="{B5B0BCFC-5364-47AE-AFB6-82E535448AA0}" type="datetimeFigureOut">
               <a:rPr lang="en-US" smtClean="0"/>
-              <a:t>5/29/2024</a:t>
+              <a:t>5/30/2024</a:t>
             </a:fld>
             <a:endParaRPr lang="en-US"/>
           </a:p>
@@ -471,7 +472,7 @@
           <a:p>
             <a:fld id="{B5B0BCFC-5364-47AE-AFB6-82E535448AA0}" type="datetimeFigureOut">
               <a:rPr lang="en-US" smtClean="0"/>
-              <a:t>5/29/2024</a:t>
+              <a:t>5/30/2024</a:t>
             </a:fld>
             <a:endParaRPr lang="en-US"/>
           </a:p>
@@ -651,7 +652,7 @@
           <a:p>
             <a:fld id="{B5B0BCFC-5364-47AE-AFB6-82E535448AA0}" type="datetimeFigureOut">
               <a:rPr lang="en-US" smtClean="0"/>
-              <a:t>5/29/2024</a:t>
+              <a:t>5/30/2024</a:t>
             </a:fld>
             <a:endParaRPr lang="en-US"/>
           </a:p>
@@ -821,7 +822,7 @@
           <a:p>
             <a:fld id="{B5B0BCFC-5364-47AE-AFB6-82E535448AA0}" type="datetimeFigureOut">
               <a:rPr lang="en-US" smtClean="0"/>
-              <a:t>5/29/2024</a:t>
+              <a:t>5/30/2024</a:t>
             </a:fld>
             <a:endParaRPr lang="en-US"/>
           </a:p>
@@ -1067,7 +1068,7 @@
           <a:p>
             <a:fld id="{B5B0BCFC-5364-47AE-AFB6-82E535448AA0}" type="datetimeFigureOut">
               <a:rPr lang="en-US" smtClean="0"/>
-              <a:t>5/29/2024</a:t>
+              <a:t>5/30/2024</a:t>
             </a:fld>
             <a:endParaRPr lang="en-US"/>
           </a:p>
@@ -1355,7 +1356,7 @@
           <a:p>
             <a:fld id="{B5B0BCFC-5364-47AE-AFB6-82E535448AA0}" type="datetimeFigureOut">
               <a:rPr lang="en-US" smtClean="0"/>
-              <a:t>5/29/2024</a:t>
+              <a:t>5/30/2024</a:t>
             </a:fld>
             <a:endParaRPr lang="en-US"/>
           </a:p>
@@ -1777,7 +1778,7 @@
           <a:p>
             <a:fld id="{B5B0BCFC-5364-47AE-AFB6-82E535448AA0}" type="datetimeFigureOut">
               <a:rPr lang="en-US" smtClean="0"/>
-              <a:t>5/29/2024</a:t>
+              <a:t>5/30/2024</a:t>
             </a:fld>
             <a:endParaRPr lang="en-US"/>
           </a:p>
@@ -1895,7 +1896,7 @@
           <a:p>
             <a:fld id="{B5B0BCFC-5364-47AE-AFB6-82E535448AA0}" type="datetimeFigureOut">
               <a:rPr lang="en-US" smtClean="0"/>
-              <a:t>5/29/2024</a:t>
+              <a:t>5/30/2024</a:t>
             </a:fld>
             <a:endParaRPr lang="en-US"/>
           </a:p>
@@ -1990,7 +1991,7 @@
           <a:p>
             <a:fld id="{B5B0BCFC-5364-47AE-AFB6-82E535448AA0}" type="datetimeFigureOut">
               <a:rPr lang="en-US" smtClean="0"/>
-              <a:t>5/29/2024</a:t>
+              <a:t>5/30/2024</a:t>
             </a:fld>
             <a:endParaRPr lang="en-US"/>
           </a:p>
@@ -2267,7 +2268,7 @@
           <a:p>
             <a:fld id="{B5B0BCFC-5364-47AE-AFB6-82E535448AA0}" type="datetimeFigureOut">
               <a:rPr lang="en-US" smtClean="0"/>
-              <a:t>5/29/2024</a:t>
+              <a:t>5/30/2024</a:t>
             </a:fld>
             <a:endParaRPr lang="en-US"/>
           </a:p>
@@ -2520,7 +2521,7 @@
           <a:p>
             <a:fld id="{B5B0BCFC-5364-47AE-AFB6-82E535448AA0}" type="datetimeFigureOut">
               <a:rPr lang="en-US" smtClean="0"/>
-              <a:t>5/29/2024</a:t>
+              <a:t>5/30/2024</a:t>
             </a:fld>
             <a:endParaRPr lang="en-US"/>
           </a:p>
@@ -2733,7 +2734,7 @@
           <a:p>
             <a:fld id="{B5B0BCFC-5364-47AE-AFB6-82E535448AA0}" type="datetimeFigureOut">
               <a:rPr lang="en-US" smtClean="0"/>
-              <a:t>5/29/2024</a:t>
+              <a:t>5/30/2024</a:t>
             </a:fld>
             <a:endParaRPr lang="en-US"/>
           </a:p>
@@ -3130,11 +3131,7 @@
           <a:p>
             <a:r>
               <a:rPr lang="en-US" dirty="0" smtClean="0"/>
-              <a:t>Speech </a:t>
-            </a:r>
-            <a:r>
-              <a:rPr lang="en-US" dirty="0" smtClean="0"/>
-              <a:t>Emotion Recognition </a:t>
+              <a:t>Speech Emotion Recognition </a:t>
             </a:r>
             <a:endParaRPr lang="en-US" dirty="0"/>
           </a:p>
@@ -3206,11 +3203,7 @@
             </a:r>
             <a:r>
               <a:rPr lang="en-US" dirty="0" smtClean="0"/>
-              <a:t> </a:t>
-            </a:r>
-            <a:r>
-              <a:rPr lang="en-US" dirty="0" smtClean="0"/>
-              <a:t>Murthy, PhD</a:t>
+              <a:t> Murthy, PhD</a:t>
             </a:r>
             <a:endParaRPr lang="en-US" dirty="0"/>
           </a:p>
@@ -3380,29 +3373,22 @@
             <p:ph type="title"/>
           </p:nvPr>
         </p:nvSpPr>
-        <p:spPr>
-          <a:xfrm>
-            <a:off x="1600200" y="381000"/>
-            <a:ext cx="6111582" cy="457200"/>
-          </a:xfrm>
-        </p:spPr>
-        <p:txBody>
-          <a:bodyPr>
-            <a:normAutofit fontScale="90000"/>
-          </a:bodyPr>
-          <a:lstStyle/>
-          <a:p>
-            <a:r>
-              <a:rPr lang="en-US" sz="3200" dirty="0" smtClean="0"/>
-              <a:t>Feature Importance</a:t>
-            </a:r>
-            <a:endParaRPr lang="en-US" sz="3200" dirty="0"/>
+        <p:spPr/>
+        <p:txBody>
+          <a:bodyPr/>
+          <a:lstStyle/>
+          <a:p>
+            <a:r>
+              <a:rPr lang="en-US" dirty="0" smtClean="0"/>
+              <a:t>Visualizing</a:t>
+            </a:r>
+            <a:endParaRPr lang="en-US" dirty="0"/>
           </a:p>
         </p:txBody>
       </p:sp>
       <p:pic>
         <p:nvPicPr>
-          <p:cNvPr id="1027" name="Picture 3"/>
+          <p:cNvPr id="3075" name="Picture 3"/>
           <p:cNvPicPr>
             <a:picLocks noGrp="1" noChangeAspect="1" noChangeArrowheads="1"/>
           </p:cNvPicPr>
@@ -3411,7 +3397,7 @@
           </p:nvPr>
         </p:nvPicPr>
         <p:blipFill>
-          <a:blip r:embed="rId2" cstate="print">
+          <a:blip r:embed="rId2">
             <a:extLst>
               <a:ext uri="{28A0092B-C50C-407E-A947-70E740481C1C}">
                 <a14:useLocalDpi xmlns:a14="http://schemas.microsoft.com/office/drawing/2010/main" val="0"/>
@@ -3425,8 +3411,8 @@
         </p:blipFill>
         <p:spPr bwMode="auto">
           <a:xfrm>
-            <a:off x="381000" y="1371600"/>
-            <a:ext cx="3918224" cy="2262406"/>
+            <a:off x="3962400" y="1447800"/>
+            <a:ext cx="4800600" cy="4823086"/>
           </a:xfrm>
           <a:prstGeom prst="rect">
             <a:avLst/>
@@ -3466,16 +3452,169 @@
           </a:extLst>
         </p:spPr>
       </p:pic>
+      <p:sp>
+        <p:nvSpPr>
+          <p:cNvPr id="5" name="TextBox 4"/>
+          <p:cNvSpPr txBox="1"/>
+          <p:nvPr/>
+        </p:nvSpPr>
+        <p:spPr>
+          <a:xfrm>
+            <a:off x="304800" y="1952599"/>
+            <a:ext cx="3423501" cy="2862322"/>
+          </a:xfrm>
+          <a:prstGeom prst="rect">
+            <a:avLst/>
+          </a:prstGeom>
+          <a:noFill/>
+        </p:spPr>
+        <p:txBody>
+          <a:bodyPr wrap="none" rtlCol="0">
+            <a:spAutoFit/>
+          </a:bodyPr>
+          <a:lstStyle/>
+          <a:p>
+            <a:pPr marL="285750" indent="-285750">
+              <a:buFont typeface="Arial" pitchFamily="34" charset="0"/>
+              <a:buChar char="•"/>
+            </a:pPr>
+            <a:r>
+              <a:rPr lang="en-US" dirty="0" smtClean="0"/>
+              <a:t>There was a lot of overlap with </a:t>
+            </a:r>
+          </a:p>
+          <a:p>
+            <a:r>
+              <a:rPr lang="en-US" dirty="0" smtClean="0"/>
+              <a:t>each feature.</a:t>
+            </a:r>
+          </a:p>
+          <a:p>
+            <a:endParaRPr lang="en-US" dirty="0"/>
+          </a:p>
+          <a:p>
+            <a:pPr marL="285750" indent="-285750">
+              <a:buFont typeface="Arial" pitchFamily="34" charset="0"/>
+              <a:buChar char="•"/>
+            </a:pPr>
+            <a:r>
+              <a:rPr lang="en-US" dirty="0" smtClean="0"/>
+              <a:t>Needed more tools to </a:t>
+            </a:r>
+          </a:p>
+          <a:p>
+            <a:r>
+              <a:rPr lang="en-US" dirty="0" smtClean="0"/>
+              <a:t>differentiate each emotion.</a:t>
+            </a:r>
+          </a:p>
+          <a:p>
+            <a:endParaRPr lang="en-US" dirty="0"/>
+          </a:p>
+          <a:p>
+            <a:pPr marL="285750" indent="-285750">
+              <a:buFont typeface="Arial" pitchFamily="34" charset="0"/>
+              <a:buChar char="•"/>
+            </a:pPr>
+            <a:r>
+              <a:rPr lang="en-US" dirty="0" smtClean="0"/>
+              <a:t>Used Random Forest Classifier </a:t>
+            </a:r>
+          </a:p>
+          <a:p>
+            <a:r>
+              <a:rPr lang="en-US" dirty="0" smtClean="0"/>
+              <a:t>to provide feature importance.</a:t>
+            </a:r>
+          </a:p>
+          <a:p>
+            <a:endParaRPr lang="en-US" dirty="0"/>
+          </a:p>
+          <a:p>
+            <a:pPr marL="285750" indent="-285750">
+              <a:buFont typeface="Arial" pitchFamily="34" charset="0"/>
+              <a:buChar char="•"/>
+            </a:pPr>
+            <a:r>
+              <a:rPr lang="en-US" dirty="0" smtClean="0"/>
+              <a:t>Used Gradient Boosting as well.</a:t>
+            </a:r>
+            <a:endParaRPr lang="en-US" dirty="0"/>
+          </a:p>
+        </p:txBody>
+      </p:sp>
+    </p:spTree>
+    <p:extLst>
+      <p:ext uri="{BB962C8B-B14F-4D97-AF65-F5344CB8AC3E}">
+        <p14:creationId xmlns:p14="http://schemas.microsoft.com/office/powerpoint/2010/main" val="449180938"/>
+      </p:ext>
+    </p:extLst>
+  </p:cSld>
+  <p:clrMapOvr>
+    <a:masterClrMapping/>
+  </p:clrMapOvr>
+</p:sld>
+</file>
+
+<file path=ppt/slides/slide11.xml><?xml version="1.0" encoding="utf-8"?>
+<p:sld xmlns:a="http://schemas.openxmlformats.org/drawingml/2006/main" xmlns:r="http://schemas.openxmlformats.org/officeDocument/2006/relationships" xmlns:p="http://schemas.openxmlformats.org/presentationml/2006/main">
+  <p:cSld>
+    <p:spTree>
+      <p:nvGrpSpPr>
+        <p:cNvPr id="1" name=""/>
+        <p:cNvGrpSpPr/>
+        <p:nvPr/>
+      </p:nvGrpSpPr>
+      <p:grpSpPr>
+        <a:xfrm>
+          <a:off x="0" y="0"/>
+          <a:ext cx="0" cy="0"/>
+          <a:chOff x="0" y="0"/>
+          <a:chExt cx="0" cy="0"/>
+        </a:xfrm>
+      </p:grpSpPr>
+      <p:sp>
+        <p:nvSpPr>
+          <p:cNvPr id="2" name="Title 1"/>
+          <p:cNvSpPr>
+            <a:spLocks noGrp="1"/>
+          </p:cNvSpPr>
+          <p:nvPr>
+            <p:ph type="title"/>
+          </p:nvPr>
+        </p:nvSpPr>
+        <p:spPr>
+          <a:xfrm>
+            <a:off x="1600200" y="381000"/>
+            <a:ext cx="6111582" cy="457200"/>
+          </a:xfrm>
+        </p:spPr>
+        <p:txBody>
+          <a:bodyPr>
+            <a:normAutofit fontScale="90000"/>
+          </a:bodyPr>
+          <a:lstStyle/>
+          <a:p>
+            <a:r>
+              <a:rPr lang="en-US" sz="3200" dirty="0" smtClean="0"/>
+              <a:t>Feature Importance</a:t>
+            </a:r>
+            <a:endParaRPr lang="en-US" sz="3200" dirty="0"/>
+          </a:p>
+        </p:txBody>
+      </p:sp>
       <p:pic>
         <p:nvPicPr>
-          <p:cNvPr id="1028" name="Picture 4"/>
+          <p:cNvPr id="1027" name="Picture 3"/>
           <p:cNvPicPr>
-            <a:picLocks noChangeAspect="1" noChangeArrowheads="1"/>
+            <a:picLocks noGrp="1" noChangeAspect="1" noChangeArrowheads="1"/>
           </p:cNvPicPr>
-          <p:nvPr/>
+          <p:nvPr>
+            <p:ph idx="1"/>
+          </p:nvPr>
         </p:nvPicPr>
         <p:blipFill>
-          <a:blip r:embed="rId3" cstate="print">
+          <a:blip r:embed="rId2" cstate="print">
             <a:extLst>
               <a:ext uri="{28A0092B-C50C-407E-A947-70E740481C1C}">
                 <a14:useLocalDpi xmlns:a14="http://schemas.microsoft.com/office/drawing/2010/main" val="0"/>
@@ -3489,8 +3628,8 @@
         </p:blipFill>
         <p:spPr bwMode="auto">
           <a:xfrm>
-            <a:off x="381000" y="4228952"/>
-            <a:ext cx="3810000" cy="2156989"/>
+            <a:off x="381000" y="1371600"/>
+            <a:ext cx="3918224" cy="2262406"/>
           </a:xfrm>
           <a:prstGeom prst="rect">
             <a:avLst/>
@@ -3532,14 +3671,14 @@
       </p:pic>
       <p:pic>
         <p:nvPicPr>
-          <p:cNvPr id="1029" name="Picture 5"/>
+          <p:cNvPr id="1028" name="Picture 4"/>
           <p:cNvPicPr>
             <a:picLocks noChangeAspect="1" noChangeArrowheads="1"/>
           </p:cNvPicPr>
           <p:nvPr/>
         </p:nvPicPr>
         <p:blipFill>
-          <a:blip r:embed="rId4" cstate="print">
+          <a:blip r:embed="rId3" cstate="print">
             <a:extLst>
               <a:ext uri="{28A0092B-C50C-407E-A947-70E740481C1C}">
                 <a14:useLocalDpi xmlns:a14="http://schemas.microsoft.com/office/drawing/2010/main" val="0"/>
@@ -3553,8 +3692,8 @@
         </p:blipFill>
         <p:spPr bwMode="auto">
           <a:xfrm>
-            <a:off x="4800600" y="1371600"/>
-            <a:ext cx="3886200" cy="2237989"/>
+            <a:off x="381000" y="4228952"/>
+            <a:ext cx="3810000" cy="2156989"/>
           </a:xfrm>
           <a:prstGeom prst="rect">
             <a:avLst/>
@@ -3596,14 +3735,14 @@
       </p:pic>
       <p:pic>
         <p:nvPicPr>
-          <p:cNvPr id="1030" name="Picture 6"/>
+          <p:cNvPr id="1029" name="Picture 5"/>
           <p:cNvPicPr>
             <a:picLocks noChangeAspect="1" noChangeArrowheads="1"/>
           </p:cNvPicPr>
           <p:nvPr/>
         </p:nvPicPr>
         <p:blipFill>
-          <a:blip r:embed="rId5">
+          <a:blip r:embed="rId4" cstate="print">
             <a:extLst>
               <a:ext uri="{28A0092B-C50C-407E-A947-70E740481C1C}">
                 <a14:useLocalDpi xmlns:a14="http://schemas.microsoft.com/office/drawing/2010/main" val="0"/>
@@ -3617,8 +3756,8 @@
         </p:blipFill>
         <p:spPr bwMode="auto">
           <a:xfrm>
-            <a:off x="4724400" y="4142242"/>
-            <a:ext cx="3962400" cy="2330408"/>
+            <a:off x="4800600" y="1371600"/>
+            <a:ext cx="3886200" cy="2237989"/>
           </a:xfrm>
           <a:prstGeom prst="rect">
             <a:avLst/>
@@ -3658,196 +3797,16 @@
           </a:extLst>
         </p:spPr>
       </p:pic>
-      <p:sp>
-        <p:nvSpPr>
-          <p:cNvPr id="5" name="TextBox 4"/>
-          <p:cNvSpPr txBox="1"/>
-          <p:nvPr/>
-        </p:nvSpPr>
-        <p:spPr>
-          <a:xfrm>
-            <a:off x="598491" y="1002268"/>
-            <a:ext cx="3760645" cy="338554"/>
-          </a:xfrm>
-          <a:prstGeom prst="rect">
-            <a:avLst/>
-          </a:prstGeom>
-          <a:noFill/>
-        </p:spPr>
-        <p:txBody>
-          <a:bodyPr wrap="none" rtlCol="0">
-            <a:spAutoFit/>
-          </a:bodyPr>
-          <a:lstStyle/>
-          <a:p>
-            <a:r>
-              <a:rPr lang="en-US" sz="1600" dirty="0" smtClean="0"/>
-              <a:t>Random Forest – Male Feature Importance</a:t>
-            </a:r>
-            <a:endParaRPr lang="en-US" sz="1600" dirty="0"/>
-          </a:p>
-        </p:txBody>
-      </p:sp>
-      <p:sp>
-        <p:nvSpPr>
-          <p:cNvPr id="11" name="TextBox 10"/>
-          <p:cNvSpPr txBox="1"/>
-          <p:nvPr/>
-        </p:nvSpPr>
-        <p:spPr>
-          <a:xfrm>
-            <a:off x="533400" y="3803688"/>
-            <a:ext cx="3760645" cy="338554"/>
-          </a:xfrm>
-          <a:prstGeom prst="rect">
-            <a:avLst/>
-          </a:prstGeom>
-          <a:noFill/>
-        </p:spPr>
-        <p:txBody>
-          <a:bodyPr wrap="none" rtlCol="0">
-            <a:spAutoFit/>
-          </a:bodyPr>
-          <a:lstStyle/>
-          <a:p>
-            <a:r>
-              <a:rPr lang="en-US" sz="1600" dirty="0" smtClean="0"/>
-              <a:t>Random Forest – Male Feature Importance</a:t>
-            </a:r>
-            <a:endParaRPr lang="en-US" sz="1600" dirty="0"/>
-          </a:p>
-        </p:txBody>
-      </p:sp>
-      <p:sp>
-        <p:nvSpPr>
-          <p:cNvPr id="12" name="TextBox 11"/>
-          <p:cNvSpPr txBox="1"/>
-          <p:nvPr/>
-        </p:nvSpPr>
-        <p:spPr>
-          <a:xfrm>
-            <a:off x="4901477" y="1002268"/>
-            <a:ext cx="3997248" cy="338554"/>
-          </a:xfrm>
-          <a:prstGeom prst="rect">
-            <a:avLst/>
-          </a:prstGeom>
-          <a:noFill/>
-        </p:spPr>
-        <p:txBody>
-          <a:bodyPr wrap="none" rtlCol="0">
-            <a:spAutoFit/>
-          </a:bodyPr>
-          <a:lstStyle/>
-          <a:p>
-            <a:r>
-              <a:rPr lang="en-US" sz="1600" dirty="0" smtClean="0"/>
-              <a:t>Gradient Boosting – Male Feature Importance</a:t>
-            </a:r>
-            <a:endParaRPr lang="en-US" sz="1600" dirty="0"/>
-          </a:p>
-        </p:txBody>
-      </p:sp>
-      <p:sp>
-        <p:nvSpPr>
-          <p:cNvPr id="13" name="TextBox 12"/>
-          <p:cNvSpPr txBox="1"/>
-          <p:nvPr/>
-        </p:nvSpPr>
-        <p:spPr>
-          <a:xfrm>
-            <a:off x="4901477" y="3803688"/>
-            <a:ext cx="3997248" cy="338554"/>
-          </a:xfrm>
-          <a:prstGeom prst="rect">
-            <a:avLst/>
-          </a:prstGeom>
-          <a:noFill/>
-        </p:spPr>
-        <p:txBody>
-          <a:bodyPr wrap="none" rtlCol="0">
-            <a:spAutoFit/>
-          </a:bodyPr>
-          <a:lstStyle/>
-          <a:p>
-            <a:r>
-              <a:rPr lang="en-US" sz="1600" dirty="0" smtClean="0"/>
-              <a:t>Gradient Boosting – Male Feature Importance</a:t>
-            </a:r>
-            <a:endParaRPr lang="en-US" sz="1600" dirty="0"/>
-          </a:p>
-        </p:txBody>
-      </p:sp>
-    </p:spTree>
-    <p:extLst>
-      <p:ext uri="{BB962C8B-B14F-4D97-AF65-F5344CB8AC3E}">
-        <p14:creationId xmlns:p14="http://schemas.microsoft.com/office/powerpoint/2010/main" val="2119941528"/>
-      </p:ext>
-    </p:extLst>
-  </p:cSld>
-  <p:clrMapOvr>
-    <a:masterClrMapping/>
-  </p:clrMapOvr>
-</p:sld>
-</file>
-
-<file path=ppt/slides/slide11.xml><?xml version="1.0" encoding="utf-8"?>
-<p:sld xmlns:a="http://schemas.openxmlformats.org/drawingml/2006/main" xmlns:r="http://schemas.openxmlformats.org/officeDocument/2006/relationships" xmlns:p="http://schemas.openxmlformats.org/presentationml/2006/main">
-  <p:cSld>
-    <p:spTree>
-      <p:nvGrpSpPr>
-        <p:cNvPr id="1" name=""/>
-        <p:cNvGrpSpPr/>
-        <p:nvPr/>
-      </p:nvGrpSpPr>
-      <p:grpSpPr>
-        <a:xfrm>
-          <a:off x="0" y="0"/>
-          <a:ext cx="0" cy="0"/>
-          <a:chOff x="0" y="0"/>
-          <a:chExt cx="0" cy="0"/>
-        </a:xfrm>
-      </p:grpSpPr>
-      <p:sp>
-        <p:nvSpPr>
-          <p:cNvPr id="2" name="Title 1"/>
-          <p:cNvSpPr>
-            <a:spLocks noGrp="1"/>
-          </p:cNvSpPr>
-          <p:nvPr>
-            <p:ph type="title"/>
-          </p:nvPr>
-        </p:nvSpPr>
-        <p:spPr>
-          <a:xfrm>
-            <a:off x="1130300" y="228600"/>
-            <a:ext cx="6680200" cy="762000"/>
-          </a:xfrm>
-        </p:spPr>
-        <p:txBody>
-          <a:bodyPr>
-            <a:normAutofit/>
-          </a:bodyPr>
-          <a:lstStyle/>
-          <a:p>
-            <a:r>
-              <a:rPr lang="en-US" sz="4000" dirty="0" smtClean="0"/>
-              <a:t>Top Features</a:t>
-            </a:r>
-            <a:endParaRPr lang="en-US" sz="4000" dirty="0"/>
-          </a:p>
-        </p:txBody>
-      </p:sp>
       <p:pic>
         <p:nvPicPr>
-          <p:cNvPr id="2050" name="Picture 2"/>
+          <p:cNvPr id="1030" name="Picture 6"/>
           <p:cNvPicPr>
             <a:picLocks noChangeAspect="1" noChangeArrowheads="1"/>
           </p:cNvPicPr>
           <p:nvPr/>
         </p:nvPicPr>
         <p:blipFill>
-          <a:blip r:embed="rId2">
+          <a:blip r:embed="rId5">
             <a:extLst>
               <a:ext uri="{28A0092B-C50C-407E-A947-70E740481C1C}">
                 <a14:useLocalDpi xmlns:a14="http://schemas.microsoft.com/office/drawing/2010/main" val="0"/>
@@ -3861,8 +3820,8 @@
         </p:blipFill>
         <p:spPr bwMode="auto">
           <a:xfrm>
-            <a:off x="1803400" y="1077006"/>
-            <a:ext cx="5334000" cy="4293262"/>
+            <a:off x="4724400" y="4142242"/>
+            <a:ext cx="3962400" cy="2330408"/>
           </a:xfrm>
           <a:prstGeom prst="rect">
             <a:avLst/>
@@ -3910,8 +3869,8 @@
         </p:nvSpPr>
         <p:spPr>
           <a:xfrm>
-            <a:off x="332343" y="5499668"/>
-            <a:ext cx="4061857" cy="1200329"/>
+            <a:off x="598491" y="1002268"/>
+            <a:ext cx="3760645" cy="338554"/>
           </a:xfrm>
           <a:prstGeom prst="rect">
             <a:avLst/>
@@ -3919,67 +3878,29 @@
           <a:noFill/>
         </p:spPr>
         <p:txBody>
-          <a:bodyPr wrap="square" rtlCol="0">
+          <a:bodyPr wrap="none" rtlCol="0">
             <a:spAutoFit/>
           </a:bodyPr>
           <a:lstStyle/>
           <a:p>
-            <a:pPr marL="285750" indent="-285750">
-              <a:buFont typeface="Arial" pitchFamily="34" charset="0"/>
-              <a:buChar char="•"/>
-            </a:pPr>
-            <a:r>
-              <a:rPr lang="en-US" dirty="0"/>
-              <a:t>Male dataset: </a:t>
-            </a:r>
-            <a:r>
-              <a:rPr lang="en-US" dirty="0" err="1"/>
-              <a:t>mfcc_delta_median</a:t>
-            </a:r>
-            <a:r>
-              <a:rPr lang="en-US" dirty="0"/>
-              <a:t>, </a:t>
-            </a:r>
-            <a:r>
-              <a:rPr lang="en-US" dirty="0" err="1"/>
-              <a:t>rms_std</a:t>
-            </a:r>
-            <a:r>
-              <a:rPr lang="en-US" dirty="0"/>
-              <a:t>, mfcc_delta2_max, </a:t>
-            </a:r>
-            <a:r>
-              <a:rPr lang="en-US" dirty="0" err="1"/>
-              <a:t>contrast_median</a:t>
-            </a:r>
-            <a:r>
-              <a:rPr lang="en-US" dirty="0"/>
-              <a:t>, and </a:t>
-            </a:r>
-            <a:r>
-              <a:rPr lang="en-US" dirty="0" err="1"/>
-              <a:t>chroma_std</a:t>
-            </a:r>
-            <a:r>
-              <a:rPr lang="en-US" dirty="0"/>
-              <a:t>.</a:t>
-            </a:r>
-          </a:p>
-          <a:p>
-            <a:endParaRPr lang="en-US" dirty="0"/>
-          </a:p>
-        </p:txBody>
-      </p:sp>
-      <p:sp>
-        <p:nvSpPr>
-          <p:cNvPr id="9" name="TextBox 8"/>
+            <a:r>
+              <a:rPr lang="en-US" sz="1600" dirty="0" smtClean="0"/>
+              <a:t>Random Forest – Male Feature Importance</a:t>
+            </a:r>
+            <a:endParaRPr lang="en-US" sz="1600" dirty="0"/>
+          </a:p>
+        </p:txBody>
+      </p:sp>
+      <p:sp>
+        <p:nvSpPr>
+          <p:cNvPr id="11" name="TextBox 10"/>
           <p:cNvSpPr txBox="1"/>
           <p:nvPr/>
         </p:nvSpPr>
         <p:spPr>
           <a:xfrm>
-            <a:off x="4724400" y="5499669"/>
-            <a:ext cx="4061857" cy="923330"/>
+            <a:off x="533400" y="3803688"/>
+            <a:ext cx="3760645" cy="338554"/>
           </a:xfrm>
           <a:prstGeom prst="rect">
             <a:avLst/>
@@ -3987,66 +3908,83 @@
           <a:noFill/>
         </p:spPr>
         <p:txBody>
-          <a:bodyPr wrap="square" rtlCol="0">
+          <a:bodyPr wrap="none" rtlCol="0">
             <a:spAutoFit/>
           </a:bodyPr>
           <a:lstStyle/>
           <a:p>
-            <a:pPr marL="285750" indent="-285750">
-              <a:buFont typeface="Arial" pitchFamily="34" charset="0"/>
-              <a:buChar char="•"/>
-            </a:pPr>
-            <a:r>
-              <a:rPr lang="en-US" dirty="0"/>
-              <a:t>Female dataset: </a:t>
-            </a:r>
-            <a:r>
-              <a:rPr lang="en-US" dirty="0" err="1"/>
-              <a:t>mel_kurtosis</a:t>
-            </a:r>
-            <a:r>
-              <a:rPr lang="en-US" dirty="0"/>
-              <a:t>, </a:t>
-            </a:r>
-            <a:r>
-              <a:rPr lang="en-US" dirty="0" err="1"/>
-              <a:t>mfcc_skew</a:t>
-            </a:r>
-            <a:r>
-              <a:rPr lang="en-US" dirty="0"/>
-              <a:t>, </a:t>
-            </a:r>
-            <a:r>
-              <a:rPr lang="en-US" dirty="0" err="1"/>
-              <a:t>rms_std</a:t>
-            </a:r>
-            <a:r>
-              <a:rPr lang="en-US" dirty="0"/>
-              <a:t>, </a:t>
-            </a:r>
-            <a:r>
-              <a:rPr lang="en-US" dirty="0" err="1"/>
-              <a:t>mel_skew</a:t>
-            </a:r>
-            <a:r>
-              <a:rPr lang="en-US" dirty="0"/>
-              <a:t>, and </a:t>
-            </a:r>
-            <a:r>
-              <a:rPr lang="en-US" dirty="0" err="1"/>
-              <a:t>roll_off_kurtosis</a:t>
-            </a:r>
-            <a:r>
-              <a:rPr lang="en-US" dirty="0"/>
-              <a:t>.</a:t>
-            </a:r>
+            <a:r>
+              <a:rPr lang="en-US" sz="1600" dirty="0" smtClean="0"/>
+              <a:t>Random Forest – Male Feature Importance</a:t>
+            </a:r>
+            <a:endParaRPr lang="en-US" sz="1600" dirty="0"/>
+          </a:p>
+        </p:txBody>
+      </p:sp>
+      <p:sp>
+        <p:nvSpPr>
+          <p:cNvPr id="12" name="TextBox 11"/>
+          <p:cNvSpPr txBox="1"/>
+          <p:nvPr/>
+        </p:nvSpPr>
+        <p:spPr>
+          <a:xfrm>
+            <a:off x="4901477" y="1002268"/>
+            <a:ext cx="3997248" cy="338554"/>
+          </a:xfrm>
+          <a:prstGeom prst="rect">
+            <a:avLst/>
+          </a:prstGeom>
+          <a:noFill/>
+        </p:spPr>
+        <p:txBody>
+          <a:bodyPr wrap="none" rtlCol="0">
+            <a:spAutoFit/>
+          </a:bodyPr>
+          <a:lstStyle/>
+          <a:p>
+            <a:r>
+              <a:rPr lang="en-US" sz="1600" dirty="0" smtClean="0"/>
+              <a:t>Gradient Boosting – Male Feature Importance</a:t>
+            </a:r>
+            <a:endParaRPr lang="en-US" sz="1600" dirty="0"/>
+          </a:p>
+        </p:txBody>
+      </p:sp>
+      <p:sp>
+        <p:nvSpPr>
+          <p:cNvPr id="13" name="TextBox 12"/>
+          <p:cNvSpPr txBox="1"/>
+          <p:nvPr/>
+        </p:nvSpPr>
+        <p:spPr>
+          <a:xfrm>
+            <a:off x="4901477" y="3803688"/>
+            <a:ext cx="3997248" cy="338554"/>
+          </a:xfrm>
+          <a:prstGeom prst="rect">
+            <a:avLst/>
+          </a:prstGeom>
+          <a:noFill/>
+        </p:spPr>
+        <p:txBody>
+          <a:bodyPr wrap="none" rtlCol="0">
+            <a:spAutoFit/>
+          </a:bodyPr>
+          <a:lstStyle/>
+          <a:p>
+            <a:r>
+              <a:rPr lang="en-US" sz="1600" dirty="0" smtClean="0"/>
+              <a:t>Gradient Boosting – Male Feature Importance</a:t>
+            </a:r>
+            <a:endParaRPr lang="en-US" sz="1600" dirty="0"/>
           </a:p>
         </p:txBody>
       </p:sp>
     </p:spTree>
     <p:extLst>
       <p:ext uri="{BB962C8B-B14F-4D97-AF65-F5344CB8AC3E}">
-        <p14:creationId xmlns:p14="http://schemas.microsoft.com/office/powerpoint/2010/main" val="2533005396"/>
+        <p14:creationId xmlns:p14="http://schemas.microsoft.com/office/powerpoint/2010/main" val="2119941528"/>
       </p:ext>
     </p:extLst>
   </p:cSld>
@@ -4083,31 +4021,36 @@
             <p:ph type="title"/>
           </p:nvPr>
         </p:nvSpPr>
-        <p:spPr/>
-        <p:txBody>
-          <a:bodyPr/>
-          <a:lstStyle/>
-          <a:p>
-            <a:r>
-              <a:rPr lang="en-US" dirty="0" smtClean="0"/>
-              <a:t>Results</a:t>
-            </a:r>
-            <a:endParaRPr lang="en-US" dirty="0"/>
+        <p:spPr>
+          <a:xfrm>
+            <a:off x="1130300" y="228600"/>
+            <a:ext cx="6680200" cy="762000"/>
+          </a:xfrm>
+        </p:spPr>
+        <p:txBody>
+          <a:bodyPr>
+            <a:normAutofit/>
+          </a:bodyPr>
+          <a:lstStyle/>
+          <a:p>
+            <a:r>
+              <a:rPr lang="en-US" sz="4000" dirty="0" smtClean="0"/>
+              <a:t>Top Features</a:t>
+            </a:r>
+            <a:endParaRPr lang="en-US" sz="4000" dirty="0"/>
           </a:p>
         </p:txBody>
       </p:sp>
       <p:pic>
         <p:nvPicPr>
-          <p:cNvPr id="4098" name="Picture 2"/>
+          <p:cNvPr id="2050" name="Picture 2"/>
           <p:cNvPicPr>
-            <a:picLocks noGrp="1" noChangeAspect="1" noChangeArrowheads="1"/>
+            <a:picLocks noChangeAspect="1" noChangeArrowheads="1"/>
           </p:cNvPicPr>
-          <p:nvPr>
-            <p:ph idx="1"/>
-          </p:nvPr>
+          <p:nvPr/>
         </p:nvPicPr>
         <p:blipFill>
-          <a:blip r:embed="rId2" cstate="print">
+          <a:blip r:embed="rId2">
             <a:extLst>
               <a:ext uri="{28A0092B-C50C-407E-A947-70E740481C1C}">
                 <a14:useLocalDpi xmlns:a14="http://schemas.microsoft.com/office/drawing/2010/main" val="0"/>
@@ -4121,8 +4064,8 @@
         </p:blipFill>
         <p:spPr bwMode="auto">
           <a:xfrm>
-            <a:off x="304800" y="2133600"/>
-            <a:ext cx="4078240" cy="3581400"/>
+            <a:off x="1803400" y="1077006"/>
+            <a:ext cx="5334000" cy="4293262"/>
           </a:xfrm>
           <a:prstGeom prst="rect">
             <a:avLst/>
@@ -4162,16 +4105,212 @@
           </a:extLst>
         </p:spPr>
       </p:pic>
+      <p:sp>
+        <p:nvSpPr>
+          <p:cNvPr id="5" name="TextBox 4"/>
+          <p:cNvSpPr txBox="1"/>
+          <p:nvPr/>
+        </p:nvSpPr>
+        <p:spPr>
+          <a:xfrm>
+            <a:off x="332343" y="5499668"/>
+            <a:ext cx="4061857" cy="1200329"/>
+          </a:xfrm>
+          <a:prstGeom prst="rect">
+            <a:avLst/>
+          </a:prstGeom>
+          <a:noFill/>
+        </p:spPr>
+        <p:txBody>
+          <a:bodyPr wrap="square" rtlCol="0">
+            <a:spAutoFit/>
+          </a:bodyPr>
+          <a:lstStyle/>
+          <a:p>
+            <a:pPr marL="285750" indent="-285750">
+              <a:buFont typeface="Arial" pitchFamily="34" charset="0"/>
+              <a:buChar char="•"/>
+            </a:pPr>
+            <a:r>
+              <a:rPr lang="en-US" dirty="0"/>
+              <a:t>Male dataset: </a:t>
+            </a:r>
+            <a:r>
+              <a:rPr lang="en-US" dirty="0" err="1"/>
+              <a:t>mfcc_delta_median</a:t>
+            </a:r>
+            <a:r>
+              <a:rPr lang="en-US" dirty="0"/>
+              <a:t>, </a:t>
+            </a:r>
+            <a:r>
+              <a:rPr lang="en-US" dirty="0" err="1"/>
+              <a:t>rms_std</a:t>
+            </a:r>
+            <a:r>
+              <a:rPr lang="en-US" dirty="0"/>
+              <a:t>, mfcc_delta2_max, </a:t>
+            </a:r>
+            <a:r>
+              <a:rPr lang="en-US" dirty="0" err="1"/>
+              <a:t>contrast_median</a:t>
+            </a:r>
+            <a:r>
+              <a:rPr lang="en-US" dirty="0"/>
+              <a:t>, and </a:t>
+            </a:r>
+            <a:r>
+              <a:rPr lang="en-US" dirty="0" err="1"/>
+              <a:t>chroma_std</a:t>
+            </a:r>
+            <a:r>
+              <a:rPr lang="en-US" dirty="0"/>
+              <a:t>.</a:t>
+            </a:r>
+          </a:p>
+          <a:p>
+            <a:endParaRPr lang="en-US" dirty="0"/>
+          </a:p>
+        </p:txBody>
+      </p:sp>
+      <p:sp>
+        <p:nvSpPr>
+          <p:cNvPr id="9" name="TextBox 8"/>
+          <p:cNvSpPr txBox="1"/>
+          <p:nvPr/>
+        </p:nvSpPr>
+        <p:spPr>
+          <a:xfrm>
+            <a:off x="4724400" y="5499669"/>
+            <a:ext cx="4061857" cy="923330"/>
+          </a:xfrm>
+          <a:prstGeom prst="rect">
+            <a:avLst/>
+          </a:prstGeom>
+          <a:noFill/>
+        </p:spPr>
+        <p:txBody>
+          <a:bodyPr wrap="square" rtlCol="0">
+            <a:spAutoFit/>
+          </a:bodyPr>
+          <a:lstStyle/>
+          <a:p>
+            <a:pPr marL="285750" indent="-285750">
+              <a:buFont typeface="Arial" pitchFamily="34" charset="0"/>
+              <a:buChar char="•"/>
+            </a:pPr>
+            <a:r>
+              <a:rPr lang="en-US" dirty="0"/>
+              <a:t>Female dataset: </a:t>
+            </a:r>
+            <a:r>
+              <a:rPr lang="en-US" dirty="0" err="1"/>
+              <a:t>mel_kurtosis</a:t>
+            </a:r>
+            <a:r>
+              <a:rPr lang="en-US" dirty="0"/>
+              <a:t>, </a:t>
+            </a:r>
+            <a:r>
+              <a:rPr lang="en-US" dirty="0" err="1"/>
+              <a:t>mfcc_skew</a:t>
+            </a:r>
+            <a:r>
+              <a:rPr lang="en-US" dirty="0"/>
+              <a:t>, </a:t>
+            </a:r>
+            <a:r>
+              <a:rPr lang="en-US" dirty="0" err="1"/>
+              <a:t>rms_std</a:t>
+            </a:r>
+            <a:r>
+              <a:rPr lang="en-US" dirty="0"/>
+              <a:t>, </a:t>
+            </a:r>
+            <a:r>
+              <a:rPr lang="en-US" dirty="0" err="1"/>
+              <a:t>mel_skew</a:t>
+            </a:r>
+            <a:r>
+              <a:rPr lang="en-US" dirty="0"/>
+              <a:t>, and </a:t>
+            </a:r>
+            <a:r>
+              <a:rPr lang="en-US" dirty="0" err="1"/>
+              <a:t>roll_off_kurtosis</a:t>
+            </a:r>
+            <a:r>
+              <a:rPr lang="en-US" dirty="0"/>
+              <a:t>.</a:t>
+            </a:r>
+          </a:p>
+        </p:txBody>
+      </p:sp>
+    </p:spTree>
+    <p:extLst>
+      <p:ext uri="{BB962C8B-B14F-4D97-AF65-F5344CB8AC3E}">
+        <p14:creationId xmlns:p14="http://schemas.microsoft.com/office/powerpoint/2010/main" val="2533005396"/>
+      </p:ext>
+    </p:extLst>
+  </p:cSld>
+  <p:clrMapOvr>
+    <a:masterClrMapping/>
+  </p:clrMapOvr>
+</p:sld>
+</file>
+
+<file path=ppt/slides/slide13.xml><?xml version="1.0" encoding="utf-8"?>
+<p:sld xmlns:a="http://schemas.openxmlformats.org/drawingml/2006/main" xmlns:r="http://schemas.openxmlformats.org/officeDocument/2006/relationships" xmlns:p="http://schemas.openxmlformats.org/presentationml/2006/main">
+  <p:cSld>
+    <p:spTree>
+      <p:nvGrpSpPr>
+        <p:cNvPr id="1" name=""/>
+        <p:cNvGrpSpPr/>
+        <p:nvPr/>
+      </p:nvGrpSpPr>
+      <p:grpSpPr>
+        <a:xfrm>
+          <a:off x="0" y="0"/>
+          <a:ext cx="0" cy="0"/>
+          <a:chOff x="0" y="0"/>
+          <a:chExt cx="0" cy="0"/>
+        </a:xfrm>
+      </p:grpSpPr>
+      <p:sp>
+        <p:nvSpPr>
+          <p:cNvPr id="2" name="Title 1"/>
+          <p:cNvSpPr>
+            <a:spLocks noGrp="1"/>
+          </p:cNvSpPr>
+          <p:nvPr>
+            <p:ph type="title"/>
+          </p:nvPr>
+        </p:nvSpPr>
+        <p:spPr/>
+        <p:txBody>
+          <a:bodyPr/>
+          <a:lstStyle/>
+          <a:p>
+            <a:r>
+              <a:rPr lang="en-US" dirty="0" smtClean="0"/>
+              <a:t>Results</a:t>
+            </a:r>
+            <a:endParaRPr lang="en-US" dirty="0"/>
+          </a:p>
+        </p:txBody>
+      </p:sp>
       <p:pic>
         <p:nvPicPr>
-          <p:cNvPr id="4099" name="Picture 3"/>
+          <p:cNvPr id="4098" name="Picture 2"/>
           <p:cNvPicPr>
-            <a:picLocks noChangeAspect="1" noChangeArrowheads="1"/>
+            <a:picLocks noGrp="1" noChangeAspect="1" noChangeArrowheads="1"/>
           </p:cNvPicPr>
-          <p:nvPr/>
+          <p:nvPr>
+            <p:ph idx="1"/>
+          </p:nvPr>
         </p:nvPicPr>
         <p:blipFill>
-          <a:blip r:embed="rId3">
+          <a:blip r:embed="rId2" cstate="print">
             <a:extLst>
               <a:ext uri="{28A0092B-C50C-407E-A947-70E740481C1C}">
                 <a14:useLocalDpi xmlns:a14="http://schemas.microsoft.com/office/drawing/2010/main" val="0"/>
@@ -4185,8 +4324,8 @@
         </p:blipFill>
         <p:spPr bwMode="auto">
           <a:xfrm>
-            <a:off x="4724400" y="2133600"/>
-            <a:ext cx="4017967" cy="3581400"/>
+            <a:off x="304800" y="2133600"/>
+            <a:ext cx="4078240" cy="3581400"/>
           </a:xfrm>
           <a:prstGeom prst="rect">
             <a:avLst/>
@@ -4226,196 +4365,16 @@
           </a:extLst>
         </p:spPr>
       </p:pic>
-      <p:sp>
-        <p:nvSpPr>
-          <p:cNvPr id="4" name="TextBox 3"/>
-          <p:cNvSpPr txBox="1"/>
-          <p:nvPr/>
-        </p:nvSpPr>
-        <p:spPr>
-          <a:xfrm>
-            <a:off x="1752600" y="1676400"/>
-            <a:ext cx="1409617" cy="369332"/>
-          </a:xfrm>
-          <a:prstGeom prst="rect">
-            <a:avLst/>
-          </a:prstGeom>
-          <a:noFill/>
-        </p:spPr>
-        <p:txBody>
-          <a:bodyPr wrap="none" rtlCol="0">
-            <a:spAutoFit/>
-          </a:bodyPr>
-          <a:lstStyle/>
-          <a:p>
-            <a:r>
-              <a:rPr lang="en-US" dirty="0" smtClean="0"/>
-              <a:t>Male dataset</a:t>
-            </a:r>
-            <a:endParaRPr lang="en-US" dirty="0"/>
-          </a:p>
-        </p:txBody>
-      </p:sp>
-      <p:sp>
-        <p:nvSpPr>
-          <p:cNvPr id="7" name="TextBox 6"/>
-          <p:cNvSpPr txBox="1"/>
-          <p:nvPr/>
-        </p:nvSpPr>
-        <p:spPr>
-          <a:xfrm>
-            <a:off x="6096000" y="1676400"/>
-            <a:ext cx="1614609" cy="369332"/>
-          </a:xfrm>
-          <a:prstGeom prst="rect">
-            <a:avLst/>
-          </a:prstGeom>
-          <a:noFill/>
-        </p:spPr>
-        <p:txBody>
-          <a:bodyPr wrap="none" rtlCol="0">
-            <a:spAutoFit/>
-          </a:bodyPr>
-          <a:lstStyle/>
-          <a:p>
-            <a:r>
-              <a:rPr lang="en-US" dirty="0" smtClean="0"/>
-              <a:t>Female dataset</a:t>
-            </a:r>
-            <a:endParaRPr lang="en-US" dirty="0"/>
-          </a:p>
-        </p:txBody>
-      </p:sp>
-    </p:spTree>
-    <p:extLst>
-      <p:ext uri="{BB962C8B-B14F-4D97-AF65-F5344CB8AC3E}">
-        <p14:creationId xmlns:p14="http://schemas.microsoft.com/office/powerpoint/2010/main" val="1625790843"/>
-      </p:ext>
-    </p:extLst>
-  </p:cSld>
-  <p:clrMapOvr>
-    <a:masterClrMapping/>
-  </p:clrMapOvr>
-</p:sld>
-</file>
-
-<file path=ppt/slides/slide13.xml><?xml version="1.0" encoding="utf-8"?>
-<p:sld xmlns:a="http://schemas.openxmlformats.org/drawingml/2006/main" xmlns:r="http://schemas.openxmlformats.org/officeDocument/2006/relationships" xmlns:p="http://schemas.openxmlformats.org/presentationml/2006/main">
-  <p:cSld>
-    <p:spTree>
-      <p:nvGrpSpPr>
-        <p:cNvPr id="1" name=""/>
-        <p:cNvGrpSpPr/>
-        <p:nvPr/>
-      </p:nvGrpSpPr>
-      <p:grpSpPr>
-        <a:xfrm>
-          <a:off x="0" y="0"/>
-          <a:ext cx="0" cy="0"/>
-          <a:chOff x="0" y="0"/>
-          <a:chExt cx="0" cy="0"/>
-        </a:xfrm>
-      </p:grpSpPr>
-      <p:sp>
-        <p:nvSpPr>
-          <p:cNvPr id="2" name="Title 1"/>
-          <p:cNvSpPr>
-            <a:spLocks noGrp="1"/>
-          </p:cNvSpPr>
-          <p:nvPr>
-            <p:ph type="title"/>
-          </p:nvPr>
-        </p:nvSpPr>
-        <p:spPr>
-          <a:xfrm>
-            <a:off x="457200" y="274638"/>
-            <a:ext cx="8229600" cy="715962"/>
-          </a:xfrm>
-        </p:spPr>
-        <p:txBody>
-          <a:bodyPr/>
-          <a:lstStyle/>
-          <a:p>
-            <a:r>
-              <a:rPr lang="en-US" sz="3200" dirty="0" err="1" smtClean="0"/>
-              <a:t>Conclussion</a:t>
-            </a:r>
-            <a:endParaRPr lang="en-US" dirty="0"/>
-          </a:p>
-        </p:txBody>
-      </p:sp>
-      <p:sp>
-        <p:nvSpPr>
-          <p:cNvPr id="3" name="Content Placeholder 2"/>
-          <p:cNvSpPr>
-            <a:spLocks noGrp="1"/>
-          </p:cNvSpPr>
-          <p:nvPr>
-            <p:ph idx="1"/>
-          </p:nvPr>
-        </p:nvSpPr>
-        <p:spPr>
-          <a:xfrm>
-            <a:off x="457200" y="1143000"/>
-            <a:ext cx="8229600" cy="2286000"/>
-          </a:xfrm>
-        </p:spPr>
-        <p:txBody>
-          <a:bodyPr>
-            <a:normAutofit/>
-          </a:bodyPr>
-          <a:lstStyle/>
-          <a:p>
-            <a:r>
-              <a:rPr lang="en-US" sz="2000" dirty="0" smtClean="0"/>
-              <a:t>As you can see Sad and Calm were often confused for one another.</a:t>
-            </a:r>
-          </a:p>
-          <a:p>
-            <a:pPr marL="0" indent="0">
-              <a:buNone/>
-            </a:pPr>
-            <a:endParaRPr lang="en-US" sz="2000" dirty="0" smtClean="0"/>
-          </a:p>
-          <a:p>
-            <a:r>
-              <a:rPr lang="en-US" sz="2000" dirty="0" smtClean="0"/>
-              <a:t>More professional audio data will be needed.</a:t>
-            </a:r>
-          </a:p>
-          <a:p>
-            <a:pPr marL="0" indent="0">
-              <a:buNone/>
-            </a:pPr>
-            <a:endParaRPr lang="en-US" sz="2000" dirty="0" smtClean="0"/>
-          </a:p>
-          <a:p>
-            <a:r>
-              <a:rPr lang="en-US" sz="2000" dirty="0" smtClean="0"/>
-              <a:t>Using </a:t>
-            </a:r>
-            <a:r>
-              <a:rPr lang="en-US" sz="2000" dirty="0" err="1" smtClean="0"/>
-              <a:t>Librosa</a:t>
-            </a:r>
-            <a:r>
-              <a:rPr lang="en-US" sz="2000" dirty="0" smtClean="0"/>
-              <a:t> to turn an audio problem into a visual one could potentially yield better results.</a:t>
-            </a:r>
-            <a:endParaRPr lang="en-US" sz="2000" dirty="0"/>
-          </a:p>
-        </p:txBody>
-      </p:sp>
       <p:pic>
         <p:nvPicPr>
-          <p:cNvPr id="5122" name="Picture 2"/>
+          <p:cNvPr id="4099" name="Picture 3"/>
           <p:cNvPicPr>
             <a:picLocks noChangeAspect="1" noChangeArrowheads="1"/>
           </p:cNvPicPr>
           <p:nvPr/>
         </p:nvPicPr>
         <p:blipFill>
-          <a:blip r:embed="rId2">
+          <a:blip r:embed="rId3">
             <a:extLst>
               <a:ext uri="{28A0092B-C50C-407E-A947-70E740481C1C}">
                 <a14:useLocalDpi xmlns:a14="http://schemas.microsoft.com/office/drawing/2010/main" val="0"/>
@@ -4429,8 +4388,8 @@
         </p:blipFill>
         <p:spPr bwMode="auto">
           <a:xfrm>
-            <a:off x="381000" y="3581400"/>
-            <a:ext cx="8382000" cy="2579306"/>
+            <a:off x="4724400" y="2133600"/>
+            <a:ext cx="4017967" cy="3581400"/>
           </a:xfrm>
           <a:prstGeom prst="rect">
             <a:avLst/>
@@ -4470,6 +4429,250 @@
           </a:extLst>
         </p:spPr>
       </p:pic>
+      <p:sp>
+        <p:nvSpPr>
+          <p:cNvPr id="4" name="TextBox 3"/>
+          <p:cNvSpPr txBox="1"/>
+          <p:nvPr/>
+        </p:nvSpPr>
+        <p:spPr>
+          <a:xfrm>
+            <a:off x="1752600" y="1676400"/>
+            <a:ext cx="1409617" cy="369332"/>
+          </a:xfrm>
+          <a:prstGeom prst="rect">
+            <a:avLst/>
+          </a:prstGeom>
+          <a:noFill/>
+        </p:spPr>
+        <p:txBody>
+          <a:bodyPr wrap="none" rtlCol="0">
+            <a:spAutoFit/>
+          </a:bodyPr>
+          <a:lstStyle/>
+          <a:p>
+            <a:r>
+              <a:rPr lang="en-US" dirty="0" smtClean="0"/>
+              <a:t>Male dataset</a:t>
+            </a:r>
+            <a:endParaRPr lang="en-US" dirty="0"/>
+          </a:p>
+        </p:txBody>
+      </p:sp>
+      <p:sp>
+        <p:nvSpPr>
+          <p:cNvPr id="7" name="TextBox 6"/>
+          <p:cNvSpPr txBox="1"/>
+          <p:nvPr/>
+        </p:nvSpPr>
+        <p:spPr>
+          <a:xfrm>
+            <a:off x="6096000" y="1676400"/>
+            <a:ext cx="1614609" cy="369332"/>
+          </a:xfrm>
+          <a:prstGeom prst="rect">
+            <a:avLst/>
+          </a:prstGeom>
+          <a:noFill/>
+        </p:spPr>
+        <p:txBody>
+          <a:bodyPr wrap="none" rtlCol="0">
+            <a:spAutoFit/>
+          </a:bodyPr>
+          <a:lstStyle/>
+          <a:p>
+            <a:r>
+              <a:rPr lang="en-US" dirty="0" smtClean="0"/>
+              <a:t>Female dataset</a:t>
+            </a:r>
+            <a:endParaRPr lang="en-US" dirty="0"/>
+          </a:p>
+        </p:txBody>
+      </p:sp>
+    </p:spTree>
+    <p:extLst>
+      <p:ext uri="{BB962C8B-B14F-4D97-AF65-F5344CB8AC3E}">
+        <p14:creationId xmlns:p14="http://schemas.microsoft.com/office/powerpoint/2010/main" val="1625790843"/>
+      </p:ext>
+    </p:extLst>
+  </p:cSld>
+  <p:clrMapOvr>
+    <a:masterClrMapping/>
+  </p:clrMapOvr>
+</p:sld>
+</file>
+
+<file path=ppt/slides/slide14.xml><?xml version="1.0" encoding="utf-8"?>
+<p:sld xmlns:a="http://schemas.openxmlformats.org/drawingml/2006/main" xmlns:r="http://schemas.openxmlformats.org/officeDocument/2006/relationships" xmlns:p="http://schemas.openxmlformats.org/presentationml/2006/main">
+  <p:cSld>
+    <p:spTree>
+      <p:nvGrpSpPr>
+        <p:cNvPr id="1" name=""/>
+        <p:cNvGrpSpPr/>
+        <p:nvPr/>
+      </p:nvGrpSpPr>
+      <p:grpSpPr>
+        <a:xfrm>
+          <a:off x="0" y="0"/>
+          <a:ext cx="0" cy="0"/>
+          <a:chOff x="0" y="0"/>
+          <a:chExt cx="0" cy="0"/>
+        </a:xfrm>
+      </p:grpSpPr>
+      <p:sp>
+        <p:nvSpPr>
+          <p:cNvPr id="2" name="Title 1"/>
+          <p:cNvSpPr>
+            <a:spLocks noGrp="1"/>
+          </p:cNvSpPr>
+          <p:nvPr>
+            <p:ph type="title"/>
+          </p:nvPr>
+        </p:nvSpPr>
+        <p:spPr>
+          <a:xfrm>
+            <a:off x="457200" y="274638"/>
+            <a:ext cx="8229600" cy="715962"/>
+          </a:xfrm>
+        </p:spPr>
+        <p:txBody>
+          <a:bodyPr/>
+          <a:lstStyle/>
+          <a:p>
+            <a:r>
+              <a:rPr lang="en-US" sz="3200" dirty="0" err="1" smtClean="0"/>
+              <a:t>Conclussion</a:t>
+            </a:r>
+            <a:endParaRPr lang="en-US" dirty="0"/>
+          </a:p>
+        </p:txBody>
+      </p:sp>
+      <p:sp>
+        <p:nvSpPr>
+          <p:cNvPr id="3" name="Content Placeholder 2"/>
+          <p:cNvSpPr>
+            <a:spLocks noGrp="1"/>
+          </p:cNvSpPr>
+          <p:nvPr>
+            <p:ph idx="1"/>
+          </p:nvPr>
+        </p:nvSpPr>
+        <p:spPr>
+          <a:xfrm>
+            <a:off x="457200" y="1143000"/>
+            <a:ext cx="8229600" cy="2286000"/>
+          </a:xfrm>
+        </p:spPr>
+        <p:txBody>
+          <a:bodyPr>
+            <a:normAutofit/>
+          </a:bodyPr>
+          <a:lstStyle/>
+          <a:p>
+            <a:r>
+              <a:rPr lang="en-US" sz="2000" dirty="0" smtClean="0"/>
+              <a:t>As you can see Sad and Calm were often confused for one another.</a:t>
+            </a:r>
+          </a:p>
+          <a:p>
+            <a:pPr marL="0" indent="0">
+              <a:buNone/>
+            </a:pPr>
+            <a:endParaRPr lang="en-US" sz="2000" dirty="0" smtClean="0"/>
+          </a:p>
+          <a:p>
+            <a:r>
+              <a:rPr lang="en-US" sz="2000" dirty="0" smtClean="0"/>
+              <a:t>More professional audio data will be needed.</a:t>
+            </a:r>
+          </a:p>
+          <a:p>
+            <a:pPr marL="0" indent="0">
+              <a:buNone/>
+            </a:pPr>
+            <a:endParaRPr lang="en-US" sz="2000" dirty="0" smtClean="0"/>
+          </a:p>
+          <a:p>
+            <a:r>
+              <a:rPr lang="en-US" sz="2000" dirty="0" smtClean="0"/>
+              <a:t>Using </a:t>
+            </a:r>
+            <a:r>
+              <a:rPr lang="en-US" sz="2000" dirty="0" err="1" smtClean="0"/>
+              <a:t>Librosa</a:t>
+            </a:r>
+            <a:r>
+              <a:rPr lang="en-US" sz="2000" dirty="0" smtClean="0"/>
+              <a:t> to turn an audio problem into a visual one could potentially yield better results.</a:t>
+            </a:r>
+            <a:endParaRPr lang="en-US" sz="2000" dirty="0"/>
+          </a:p>
+        </p:txBody>
+      </p:sp>
+      <p:pic>
+        <p:nvPicPr>
+          <p:cNvPr id="5122" name="Picture 2"/>
+          <p:cNvPicPr>
+            <a:picLocks noChangeAspect="1" noChangeArrowheads="1"/>
+          </p:cNvPicPr>
+          <p:nvPr/>
+        </p:nvPicPr>
+        <p:blipFill>
+          <a:blip r:embed="rId2">
+            <a:extLst>
+              <a:ext uri="{28A0092B-C50C-407E-A947-70E740481C1C}">
+                <a14:useLocalDpi xmlns:a14="http://schemas.microsoft.com/office/drawing/2010/main" val="0"/>
+              </a:ext>
+            </a:extLst>
+          </a:blip>
+          <a:srcRect/>
+          <a:stretch>
+            <a:fillRect/>
+          </a:stretch>
+        </p:blipFill>
+        <p:spPr bwMode="auto">
+          <a:xfrm>
+            <a:off x="381000" y="3581400"/>
+            <a:ext cx="8382000" cy="2579306"/>
+          </a:xfrm>
+          <a:prstGeom prst="rect">
+            <a:avLst/>
+          </a:prstGeom>
+          <a:noFill/>
+          <a:ln>
+            <a:noFill/>
+          </a:ln>
+          <a:effectLst/>
+          <a:extLst>
+            <a:ext uri="{909E8E84-426E-40DD-AFC4-6F175D3DCCD1}">
+              <a14:hiddenFill xmlns:a14="http://schemas.microsoft.com/office/drawing/2010/main">
+                <a:solidFill>
+                  <a:schemeClr val="accent1"/>
+                </a:solidFill>
+              </a14:hiddenFill>
+            </a:ext>
+            <a:ext uri="{91240B29-F687-4F45-9708-019B960494DF}">
+              <a14:hiddenLine xmlns:a14="http://schemas.microsoft.com/office/drawing/2010/main" w="9525">
+                <a:solidFill>
+                  <a:schemeClr val="tx1"/>
+                </a:solidFill>
+                <a:miter lim="800000"/>
+                <a:headEnd/>
+                <a:tailEnd/>
+              </a14:hiddenLine>
+            </a:ext>
+            <a:ext uri="{AF507438-7753-43E0-B8FC-AC1667EBCBE1}">
+              <a14:hiddenEffects xmlns:a14="http://schemas.microsoft.com/office/drawing/2010/main">
+                <a:effectLst>
+                  <a:outerShdw dist="35921" dir="2700000" algn="ctr" rotWithShape="0">
+                    <a:schemeClr val="bg2"/>
+                  </a:outerShdw>
+                </a:effectLst>
+              </a14:hiddenEffects>
+            </a:ext>
+          </a:extLst>
+        </p:spPr>
+      </p:pic>
     </p:spTree>
     <p:extLst>
       <p:ext uri="{BB962C8B-B14F-4D97-AF65-F5344CB8AC3E}">
@@ -4483,7 +4686,7 @@
 </p:sld>
 </file>
 
-<file path=ppt/slides/slide14.xml><?xml version="1.0" encoding="utf-8"?>
+<file path=ppt/slides/slide15.xml><?xml version="1.0" encoding="utf-8"?>
 <p:sld xmlns:a="http://schemas.openxmlformats.org/drawingml/2006/main" xmlns:r="http://schemas.openxmlformats.org/officeDocument/2006/relationships" xmlns:p="http://schemas.openxmlformats.org/presentationml/2006/main">
   <p:cSld>
     <p:spTree>
@@ -4756,15 +4959,7 @@
           <a:p>
             <a:r>
               <a:rPr lang="en-US" sz="2000" dirty="0" smtClean="0"/>
-              <a:t>Expanding our tools in one particular way is </a:t>
-            </a:r>
-            <a:r>
-              <a:rPr lang="en-US" sz="2000" dirty="0" smtClean="0"/>
-              <a:t>machine learning emotion </a:t>
-            </a:r>
-            <a:r>
-              <a:rPr lang="en-US" sz="2000" dirty="0" smtClean="0"/>
-              <a:t>detection in human speech.</a:t>
+              <a:t>Expanding our tools in one particular way is machine learning emotion detection in human speech.</a:t>
             </a:r>
             <a:endParaRPr lang="en-US" sz="2000" dirty="0"/>
           </a:p>
@@ -5038,6 +5233,400 @@
             <p:ph type="title"/>
           </p:nvPr>
         </p:nvSpPr>
+        <p:spPr>
+          <a:xfrm>
+            <a:off x="419100" y="457200"/>
+            <a:ext cx="8229600" cy="792162"/>
+          </a:xfrm>
+        </p:spPr>
+        <p:txBody>
+          <a:bodyPr/>
+          <a:lstStyle/>
+          <a:p>
+            <a:r>
+              <a:rPr lang="en-US" dirty="0" smtClean="0"/>
+              <a:t>Problem Statement</a:t>
+            </a:r>
+            <a:endParaRPr lang="en-US" dirty="0"/>
+          </a:p>
+        </p:txBody>
+      </p:sp>
+      <p:pic>
+        <p:nvPicPr>
+          <p:cNvPr id="1026" name="Picture 2" descr="C:\Users\where\Downloads\loudspeaker-1459128_1280.png"/>
+          <p:cNvPicPr>
+            <a:picLocks noChangeAspect="1" noChangeArrowheads="1"/>
+          </p:cNvPicPr>
+          <p:nvPr/>
+        </p:nvPicPr>
+        <p:blipFill>
+          <a:blip r:embed="rId2" cstate="print">
+            <a:extLst>
+              <a:ext uri="{28A0092B-C50C-407E-A947-70E740481C1C}">
+                <a14:useLocalDpi xmlns:a14="http://schemas.microsoft.com/office/drawing/2010/main" val="0"/>
+              </a:ext>
+            </a:extLst>
+          </a:blip>
+          <a:srcRect/>
+          <a:stretch>
+            <a:fillRect/>
+          </a:stretch>
+        </p:blipFill>
+        <p:spPr bwMode="auto">
+          <a:xfrm>
+            <a:off x="381000" y="3777156"/>
+            <a:ext cx="1535576" cy="1487589"/>
+          </a:xfrm>
+          <a:prstGeom prst="rect">
+            <a:avLst/>
+          </a:prstGeom>
+          <a:noFill/>
+          <a:extLst>
+            <a:ext uri="{909E8E84-426E-40DD-AFC4-6F175D3DCCD1}">
+              <a14:hiddenFill xmlns:a14="http://schemas.microsoft.com/office/drawing/2010/main">
+                <a:solidFill>
+                  <a:srgbClr val="FFFFFF"/>
+                </a:solidFill>
+              </a14:hiddenFill>
+            </a:ext>
+          </a:extLst>
+        </p:spPr>
+      </p:pic>
+      <p:pic>
+        <p:nvPicPr>
+          <p:cNvPr id="1027" name="Picture 3" descr="C:\Users\where\Downloads\wireless-microphone-2907453_1280.png"/>
+          <p:cNvPicPr>
+            <a:picLocks noChangeAspect="1" noChangeArrowheads="1"/>
+          </p:cNvPicPr>
+          <p:nvPr/>
+        </p:nvPicPr>
+        <p:blipFill>
+          <a:blip r:embed="rId3" cstate="print">
+            <a:extLst>
+              <a:ext uri="{28A0092B-C50C-407E-A947-70E740481C1C}">
+                <a14:useLocalDpi xmlns:a14="http://schemas.microsoft.com/office/drawing/2010/main" val="0"/>
+              </a:ext>
+            </a:extLst>
+          </a:blip>
+          <a:srcRect/>
+          <a:stretch>
+            <a:fillRect/>
+          </a:stretch>
+        </p:blipFill>
+        <p:spPr bwMode="auto">
+          <a:xfrm>
+            <a:off x="2133600" y="4076281"/>
+            <a:ext cx="1683953" cy="889338"/>
+          </a:xfrm>
+          <a:prstGeom prst="rect">
+            <a:avLst/>
+          </a:prstGeom>
+          <a:noFill/>
+          <a:extLst>
+            <a:ext uri="{909E8E84-426E-40DD-AFC4-6F175D3DCCD1}">
+              <a14:hiddenFill xmlns:a14="http://schemas.microsoft.com/office/drawing/2010/main">
+                <a:solidFill>
+                  <a:srgbClr val="FFFFFF"/>
+                </a:solidFill>
+              </a14:hiddenFill>
+            </a:ext>
+          </a:extLst>
+        </p:spPr>
+      </p:pic>
+      <p:pic>
+        <p:nvPicPr>
+          <p:cNvPr id="1028" name="Picture 4" descr="C:\Users\where\Downloads\circuits-5896293_1280.jpg"/>
+          <p:cNvPicPr>
+            <a:picLocks noChangeAspect="1" noChangeArrowheads="1"/>
+          </p:cNvPicPr>
+          <p:nvPr/>
+        </p:nvPicPr>
+        <p:blipFill>
+          <a:blip r:embed="rId4" cstate="print">
+            <a:extLst>
+              <a:ext uri="{28A0092B-C50C-407E-A947-70E740481C1C}">
+                <a14:useLocalDpi xmlns:a14="http://schemas.microsoft.com/office/drawing/2010/main" val="0"/>
+              </a:ext>
+            </a:extLst>
+          </a:blip>
+          <a:srcRect/>
+          <a:stretch>
+            <a:fillRect/>
+          </a:stretch>
+        </p:blipFill>
+        <p:spPr bwMode="auto">
+          <a:xfrm>
+            <a:off x="4184000" y="3892786"/>
+            <a:ext cx="1885227" cy="1256327"/>
+          </a:xfrm>
+          <a:prstGeom prst="rect">
+            <a:avLst/>
+          </a:prstGeom>
+          <a:noFill/>
+          <a:extLst>
+            <a:ext uri="{909E8E84-426E-40DD-AFC4-6F175D3DCCD1}">
+              <a14:hiddenFill xmlns:a14="http://schemas.microsoft.com/office/drawing/2010/main">
+                <a:solidFill>
+                  <a:srgbClr val="FFFFFF"/>
+                </a:solidFill>
+              </a14:hiddenFill>
+            </a:ext>
+          </a:extLst>
+        </p:spPr>
+      </p:pic>
+      <p:pic>
+        <p:nvPicPr>
+          <p:cNvPr id="1029" name="Picture 5" descr="C:\Users\where\Downloads\smiley-2979107_1280.jpg"/>
+          <p:cNvPicPr>
+            <a:picLocks noChangeAspect="1" noChangeArrowheads="1"/>
+          </p:cNvPicPr>
+          <p:nvPr/>
+        </p:nvPicPr>
+        <p:blipFill>
+          <a:blip r:embed="rId5" cstate="print">
+            <a:extLst>
+              <a:ext uri="{28A0092B-C50C-407E-A947-70E740481C1C}">
+                <a14:useLocalDpi xmlns:a14="http://schemas.microsoft.com/office/drawing/2010/main" val="0"/>
+              </a:ext>
+            </a:extLst>
+          </a:blip>
+          <a:srcRect/>
+          <a:stretch>
+            <a:fillRect/>
+          </a:stretch>
+        </p:blipFill>
+        <p:spPr bwMode="auto">
+          <a:xfrm>
+            <a:off x="6400800" y="3900356"/>
+            <a:ext cx="2206552" cy="1241185"/>
+          </a:xfrm>
+          <a:prstGeom prst="rect">
+            <a:avLst/>
+          </a:prstGeom>
+          <a:noFill/>
+          <a:extLst>
+            <a:ext uri="{909E8E84-426E-40DD-AFC4-6F175D3DCCD1}">
+              <a14:hiddenFill xmlns:a14="http://schemas.microsoft.com/office/drawing/2010/main">
+                <a:solidFill>
+                  <a:srgbClr val="FFFFFF"/>
+                </a:solidFill>
+              </a14:hiddenFill>
+            </a:ext>
+          </a:extLst>
+        </p:spPr>
+      </p:pic>
+      <p:sp>
+        <p:nvSpPr>
+          <p:cNvPr id="4" name="TextBox 3"/>
+          <p:cNvSpPr txBox="1"/>
+          <p:nvPr/>
+        </p:nvSpPr>
+        <p:spPr>
+          <a:xfrm>
+            <a:off x="1676400" y="1600200"/>
+            <a:ext cx="5715000" cy="923330"/>
+          </a:xfrm>
+          <a:prstGeom prst="rect">
+            <a:avLst/>
+          </a:prstGeom>
+          <a:noFill/>
+        </p:spPr>
+        <p:txBody>
+          <a:bodyPr wrap="square" rtlCol="0">
+            <a:spAutoFit/>
+          </a:bodyPr>
+          <a:lstStyle/>
+          <a:p>
+            <a:r>
+              <a:rPr lang="en-US" dirty="0"/>
+              <a:t>The purpose of this data science project is to come up with a </a:t>
+            </a:r>
+            <a:r>
+              <a:rPr lang="en-US" dirty="0" smtClean="0"/>
+              <a:t>predictive </a:t>
+            </a:r>
+            <a:r>
+              <a:rPr lang="en-US" dirty="0"/>
+              <a:t>model for emotion recognition in speech.</a:t>
+            </a:r>
+          </a:p>
+          <a:p>
+            <a:endParaRPr lang="en-US" dirty="0"/>
+          </a:p>
+        </p:txBody>
+      </p:sp>
+      <p:sp>
+        <p:nvSpPr>
+          <p:cNvPr id="9" name="Curved Up Arrow 8"/>
+          <p:cNvSpPr/>
+          <p:nvPr/>
+        </p:nvSpPr>
+        <p:spPr>
+          <a:xfrm>
+            <a:off x="3276600" y="5290788"/>
+            <a:ext cx="1600200" cy="731520"/>
+          </a:xfrm>
+          <a:prstGeom prst="curvedUpArrow">
+            <a:avLst/>
+          </a:prstGeom>
+        </p:spPr>
+        <p:style>
+          <a:lnRef idx="2">
+            <a:schemeClr val="accent1">
+              <a:shade val="50000"/>
+            </a:schemeClr>
+          </a:lnRef>
+          <a:fillRef idx="1">
+            <a:schemeClr val="accent1"/>
+          </a:fillRef>
+          <a:effectRef idx="0">
+            <a:schemeClr val="accent1"/>
+          </a:effectRef>
+          <a:fontRef idx="minor">
+            <a:schemeClr val="lt1"/>
+          </a:fontRef>
+        </p:style>
+        <p:txBody>
+          <a:bodyPr rtlCol="0" anchor="ctr"/>
+          <a:lstStyle/>
+          <a:p>
+            <a:pPr algn="ctr"/>
+            <a:endParaRPr lang="en-US">
+              <a:solidFill>
+                <a:schemeClr val="tx1"/>
+              </a:solidFill>
+            </a:endParaRPr>
+          </a:p>
+        </p:txBody>
+      </p:sp>
+      <p:sp>
+        <p:nvSpPr>
+          <p:cNvPr id="10" name="Curved Down Arrow 9"/>
+          <p:cNvSpPr/>
+          <p:nvPr/>
+        </p:nvSpPr>
+        <p:spPr>
+          <a:xfrm>
+            <a:off x="1333500" y="2883447"/>
+            <a:ext cx="1600200" cy="749847"/>
+          </a:xfrm>
+          <a:prstGeom prst="curvedDownArrow">
+            <a:avLst/>
+          </a:prstGeom>
+        </p:spPr>
+        <p:style>
+          <a:lnRef idx="2">
+            <a:schemeClr val="accent1">
+              <a:shade val="50000"/>
+            </a:schemeClr>
+          </a:lnRef>
+          <a:fillRef idx="1">
+            <a:schemeClr val="accent1"/>
+          </a:fillRef>
+          <a:effectRef idx="0">
+            <a:schemeClr val="accent1"/>
+          </a:effectRef>
+          <a:fontRef idx="minor">
+            <a:schemeClr val="lt1"/>
+          </a:fontRef>
+        </p:style>
+        <p:txBody>
+          <a:bodyPr rtlCol="0" anchor="ctr"/>
+          <a:lstStyle/>
+          <a:p>
+            <a:pPr algn="ctr"/>
+            <a:endParaRPr lang="en-US">
+              <a:solidFill>
+                <a:schemeClr val="tx1"/>
+              </a:solidFill>
+            </a:endParaRPr>
+          </a:p>
+        </p:txBody>
+      </p:sp>
+      <p:sp>
+        <p:nvSpPr>
+          <p:cNvPr id="16" name="Curved Down Arrow 15"/>
+          <p:cNvSpPr/>
+          <p:nvPr/>
+        </p:nvSpPr>
+        <p:spPr>
+          <a:xfrm>
+            <a:off x="5562600" y="2883447"/>
+            <a:ext cx="1600200" cy="749847"/>
+          </a:xfrm>
+          <a:prstGeom prst="curvedDownArrow">
+            <a:avLst/>
+          </a:prstGeom>
+        </p:spPr>
+        <p:style>
+          <a:lnRef idx="2">
+            <a:schemeClr val="accent1">
+              <a:shade val="50000"/>
+            </a:schemeClr>
+          </a:lnRef>
+          <a:fillRef idx="1">
+            <a:schemeClr val="accent1"/>
+          </a:fillRef>
+          <a:effectRef idx="0">
+            <a:schemeClr val="accent1"/>
+          </a:effectRef>
+          <a:fontRef idx="minor">
+            <a:schemeClr val="lt1"/>
+          </a:fontRef>
+        </p:style>
+        <p:txBody>
+          <a:bodyPr rtlCol="0" anchor="ctr"/>
+          <a:lstStyle/>
+          <a:p>
+            <a:pPr algn="ctr"/>
+            <a:endParaRPr lang="en-US">
+              <a:solidFill>
+                <a:schemeClr val="tx1"/>
+              </a:solidFill>
+            </a:endParaRPr>
+          </a:p>
+        </p:txBody>
+      </p:sp>
+    </p:spTree>
+    <p:extLst>
+      <p:ext uri="{BB962C8B-B14F-4D97-AF65-F5344CB8AC3E}">
+        <p14:creationId xmlns:p14="http://schemas.microsoft.com/office/powerpoint/2010/main" val="618121819"/>
+      </p:ext>
+    </p:extLst>
+  </p:cSld>
+  <p:clrMapOvr>
+    <a:masterClrMapping/>
+  </p:clrMapOvr>
+</p:sld>
+</file>
+
+<file path=ppt/slides/slide4.xml><?xml version="1.0" encoding="utf-8"?>
+<p:sld xmlns:a="http://schemas.openxmlformats.org/drawingml/2006/main" xmlns:r="http://schemas.openxmlformats.org/officeDocument/2006/relationships" xmlns:p="http://schemas.openxmlformats.org/presentationml/2006/main">
+  <p:cSld>
+    <p:spTree>
+      <p:nvGrpSpPr>
+        <p:cNvPr id="1" name=""/>
+        <p:cNvGrpSpPr/>
+        <p:nvPr/>
+      </p:nvGrpSpPr>
+      <p:grpSpPr>
+        <a:xfrm>
+          <a:off x="0" y="0"/>
+          <a:ext cx="0" cy="0"/>
+          <a:chOff x="0" y="0"/>
+          <a:chExt cx="0" cy="0"/>
+        </a:xfrm>
+      </p:grpSpPr>
+      <p:sp>
+        <p:nvSpPr>
+          <p:cNvPr id="2" name="Title 1"/>
+          <p:cNvSpPr>
+            <a:spLocks noGrp="1"/>
+          </p:cNvSpPr>
+          <p:nvPr>
+            <p:ph type="title"/>
+          </p:nvPr>
+        </p:nvSpPr>
         <p:spPr/>
         <p:txBody>
           <a:bodyPr/>
@@ -5222,7 +5811,7 @@
 </p:sld>
 </file>
 
-<file path=ppt/slides/slide4.xml><?xml version="1.0" encoding="utf-8"?>
+<file path=ppt/slides/slide5.xml><?xml version="1.0" encoding="utf-8"?>
 <p:sld xmlns:a="http://schemas.openxmlformats.org/drawingml/2006/main" xmlns:r="http://schemas.openxmlformats.org/officeDocument/2006/relationships" xmlns:p="http://schemas.openxmlformats.org/presentationml/2006/main">
   <p:cSld>
     <p:spTree>
@@ -5433,7 +6022,7 @@
 </p:sld>
 </file>
 
-<file path=ppt/slides/slide5.xml><?xml version="1.0" encoding="utf-8"?>
+<file path=ppt/slides/slide6.xml><?xml version="1.0" encoding="utf-8"?>
 <p:sld xmlns:a="http://schemas.openxmlformats.org/drawingml/2006/main" xmlns:r="http://schemas.openxmlformats.org/officeDocument/2006/relationships" xmlns:p="http://schemas.openxmlformats.org/presentationml/2006/main">
   <p:cSld>
     <p:spTree>
@@ -5549,7 +6138,7 @@
 </p:sld>
 </file>
 
-<file path=ppt/slides/slide6.xml><?xml version="1.0" encoding="utf-8"?>
+<file path=ppt/slides/slide7.xml><?xml version="1.0" encoding="utf-8"?>
 <p:sld xmlns:a="http://schemas.openxmlformats.org/drawingml/2006/main" xmlns:r="http://schemas.openxmlformats.org/officeDocument/2006/relationships" xmlns:p="http://schemas.openxmlformats.org/presentationml/2006/main">
   <p:cSld>
     <p:spTree>
@@ -5781,7 +6370,7 @@
 </p:sld>
 </file>
 
-<file path=ppt/slides/slide7.xml><?xml version="1.0" encoding="utf-8"?>
+<file path=ppt/slides/slide8.xml><?xml version="1.0" encoding="utf-8"?>
 <p:sld xmlns:a="http://schemas.openxmlformats.org/drawingml/2006/main" xmlns:r="http://schemas.openxmlformats.org/officeDocument/2006/relationships" xmlns:p="http://schemas.openxmlformats.org/presentationml/2006/main">
   <p:cSld>
     <p:spTree>
@@ -6017,7 +6606,7 @@
 </p:sld>
 </file>
 
-<file path=ppt/slides/slide8.xml><?xml version="1.0" encoding="utf-8"?>
+<file path=ppt/slides/slide9.xml><?xml version="1.0" encoding="utf-8"?>
 <p:sld xmlns:a="http://schemas.openxmlformats.org/drawingml/2006/main" xmlns:r="http://schemas.openxmlformats.org/officeDocument/2006/relationships" xmlns:p="http://schemas.openxmlformats.org/presentationml/2006/main">
   <p:cSld>
     <p:spTree>
@@ -6241,216 +6830,6 @@
     <p:extLst>
       <p:ext uri="{BB962C8B-B14F-4D97-AF65-F5344CB8AC3E}">
         <p14:creationId xmlns:p14="http://schemas.microsoft.com/office/powerpoint/2010/main" val="28105156"/>
-      </p:ext>
-    </p:extLst>
-  </p:cSld>
-  <p:clrMapOvr>
-    <a:masterClrMapping/>
-  </p:clrMapOvr>
-</p:sld>
-</file>
-
-<file path=ppt/slides/slide9.xml><?xml version="1.0" encoding="utf-8"?>
-<p:sld xmlns:a="http://schemas.openxmlformats.org/drawingml/2006/main" xmlns:r="http://schemas.openxmlformats.org/officeDocument/2006/relationships" xmlns:p="http://schemas.openxmlformats.org/presentationml/2006/main">
-  <p:cSld>
-    <p:spTree>
-      <p:nvGrpSpPr>
-        <p:cNvPr id="1" name=""/>
-        <p:cNvGrpSpPr/>
-        <p:nvPr/>
-      </p:nvGrpSpPr>
-      <p:grpSpPr>
-        <a:xfrm>
-          <a:off x="0" y="0"/>
-          <a:ext cx="0" cy="0"/>
-          <a:chOff x="0" y="0"/>
-          <a:chExt cx="0" cy="0"/>
-        </a:xfrm>
-      </p:grpSpPr>
-      <p:sp>
-        <p:nvSpPr>
-          <p:cNvPr id="2" name="Title 1"/>
-          <p:cNvSpPr>
-            <a:spLocks noGrp="1"/>
-          </p:cNvSpPr>
-          <p:nvPr>
-            <p:ph type="title"/>
-          </p:nvPr>
-        </p:nvSpPr>
-        <p:spPr/>
-        <p:txBody>
-          <a:bodyPr/>
-          <a:lstStyle/>
-          <a:p>
-            <a:r>
-              <a:rPr lang="en-US" dirty="0" smtClean="0"/>
-              <a:t>Visualizing</a:t>
-            </a:r>
-            <a:endParaRPr lang="en-US" dirty="0"/>
-          </a:p>
-        </p:txBody>
-      </p:sp>
-      <p:pic>
-        <p:nvPicPr>
-          <p:cNvPr id="3075" name="Picture 3"/>
-          <p:cNvPicPr>
-            <a:picLocks noGrp="1" noChangeAspect="1" noChangeArrowheads="1"/>
-          </p:cNvPicPr>
-          <p:nvPr>
-            <p:ph idx="1"/>
-          </p:nvPr>
-        </p:nvPicPr>
-        <p:blipFill>
-          <a:blip r:embed="rId2">
-            <a:extLst>
-              <a:ext uri="{28A0092B-C50C-407E-A947-70E740481C1C}">
-                <a14:useLocalDpi xmlns:a14="http://schemas.microsoft.com/office/drawing/2010/main" val="0"/>
-              </a:ext>
-            </a:extLst>
-          </a:blip>
-          <a:srcRect/>
-          <a:stretch>
-            <a:fillRect/>
-          </a:stretch>
-        </p:blipFill>
-        <p:spPr bwMode="auto">
-          <a:xfrm>
-            <a:off x="3962400" y="1447800"/>
-            <a:ext cx="4800600" cy="4823086"/>
-          </a:xfrm>
-          <a:prstGeom prst="rect">
-            <a:avLst/>
-          </a:prstGeom>
-          <a:noFill/>
-          <a:ln>
-            <a:noFill/>
-          </a:ln>
-          <a:effectLst/>
-          <a:extLst>
-            <a:ext uri="{909E8E84-426E-40DD-AFC4-6F175D3DCCD1}">
-              <a14:hiddenFill xmlns:a14="http://schemas.microsoft.com/office/drawing/2010/main">
-                <a:solidFill>
-                  <a:schemeClr val="accent1"/>
-                </a:solidFill>
-              </a14:hiddenFill>
-            </a:ext>
-            <a:ext uri="{91240B29-F687-4F45-9708-019B960494DF}">
-              <a14:hiddenLine xmlns:a14="http://schemas.microsoft.com/office/drawing/2010/main" w="9525">
-                <a:solidFill>
-                  <a:schemeClr val="tx1"/>
-                </a:solidFill>
-                <a:miter lim="800000"/>
-                <a:headEnd/>
-                <a:tailEnd/>
-              </a14:hiddenLine>
-            </a:ext>
-            <a:ext uri="{AF507438-7753-43E0-B8FC-AC1667EBCBE1}">
-              <a14:hiddenEffects xmlns:a14="http://schemas.microsoft.com/office/drawing/2010/main">
-                <a:effectLst>
-                  <a:outerShdw dist="35921" dir="2700000" algn="ctr" rotWithShape="0">
-                    <a:schemeClr val="bg2"/>
-                  </a:outerShdw>
-                </a:effectLst>
-              </a14:hiddenEffects>
-            </a:ext>
-          </a:extLst>
-        </p:spPr>
-      </p:pic>
-      <p:sp>
-        <p:nvSpPr>
-          <p:cNvPr id="5" name="TextBox 4"/>
-          <p:cNvSpPr txBox="1"/>
-          <p:nvPr/>
-        </p:nvSpPr>
-        <p:spPr>
-          <a:xfrm>
-            <a:off x="304800" y="1952599"/>
-            <a:ext cx="3423501" cy="2862322"/>
-          </a:xfrm>
-          <a:prstGeom prst="rect">
-            <a:avLst/>
-          </a:prstGeom>
-          <a:noFill/>
-        </p:spPr>
-        <p:txBody>
-          <a:bodyPr wrap="none" rtlCol="0">
-            <a:spAutoFit/>
-          </a:bodyPr>
-          <a:lstStyle/>
-          <a:p>
-            <a:pPr marL="285750" indent="-285750">
-              <a:buFont typeface="Arial" pitchFamily="34" charset="0"/>
-              <a:buChar char="•"/>
-            </a:pPr>
-            <a:r>
-              <a:rPr lang="en-US" dirty="0" smtClean="0"/>
-              <a:t>There was a lot of overlap with </a:t>
-            </a:r>
-          </a:p>
-          <a:p>
-            <a:r>
-              <a:rPr lang="en-US" dirty="0" smtClean="0"/>
-              <a:t>each feature.</a:t>
-            </a:r>
-          </a:p>
-          <a:p>
-            <a:endParaRPr lang="en-US" dirty="0"/>
-          </a:p>
-          <a:p>
-            <a:pPr marL="285750" indent="-285750">
-              <a:buFont typeface="Arial" pitchFamily="34" charset="0"/>
-              <a:buChar char="•"/>
-            </a:pPr>
-            <a:r>
-              <a:rPr lang="en-US" dirty="0" smtClean="0"/>
-              <a:t>Needed more tools to </a:t>
-            </a:r>
-          </a:p>
-          <a:p>
-            <a:r>
-              <a:rPr lang="en-US" dirty="0" smtClean="0"/>
-              <a:t>differentiate each emotion.</a:t>
-            </a:r>
-          </a:p>
-          <a:p>
-            <a:endParaRPr lang="en-US" dirty="0"/>
-          </a:p>
-          <a:p>
-            <a:pPr marL="285750" indent="-285750">
-              <a:buFont typeface="Arial" pitchFamily="34" charset="0"/>
-              <a:buChar char="•"/>
-            </a:pPr>
-            <a:r>
-              <a:rPr lang="en-US" dirty="0" smtClean="0"/>
-              <a:t>Used Random Forest Classifier </a:t>
-            </a:r>
-          </a:p>
-          <a:p>
-            <a:r>
-              <a:rPr lang="en-US" dirty="0" smtClean="0"/>
-              <a:t>to provide feature importance.</a:t>
-            </a:r>
-          </a:p>
-          <a:p>
-            <a:endParaRPr lang="en-US" dirty="0"/>
-          </a:p>
-          <a:p>
-            <a:pPr marL="285750" indent="-285750">
-              <a:buFont typeface="Arial" pitchFamily="34" charset="0"/>
-              <a:buChar char="•"/>
-            </a:pPr>
-            <a:r>
-              <a:rPr lang="en-US" dirty="0" smtClean="0"/>
-              <a:t>Used Gradient Boosting as well.</a:t>
-            </a:r>
-            <a:endParaRPr lang="en-US" dirty="0"/>
-          </a:p>
-        </p:txBody>
-      </p:sp>
-    </p:spTree>
-    <p:extLst>
-      <p:ext uri="{BB962C8B-B14F-4D97-AF65-F5344CB8AC3E}">
-        <p14:creationId xmlns:p14="http://schemas.microsoft.com/office/powerpoint/2010/main" val="449180938"/>
       </p:ext>
     </p:extLst>
   </p:cSld>

</xml_diff>